<commit_message>
add SerlvetScope, put imggit add .
</commit_message>
<xml_diff>
--- a/PPT/Error Solution PPT/ErrorSolution.pptx
+++ b/PPT/Error Solution PPT/ErrorSolution.pptx
@@ -11,6 +11,7 @@
     <p:sldId id="259" r:id="rId5"/>
     <p:sldId id="260" r:id="rId6"/>
     <p:sldId id="261" r:id="rId7"/>
+    <p:sldId id="262" r:id="rId8"/>
   </p:sldIdLst>
   <p:sldSz cx="12192000" cy="6858000"/>
   <p:notesSz cx="6858000" cy="9144000"/>
@@ -111,7 +112,7 @@
   </p:defaultTextStyle>
   <p:extLst>
     <p:ext uri="{EFAFB233-063F-42B5-8137-9DF3F51BA10A}">
-      <p15:sldGuideLst xmlns="" xmlns:p15="http://schemas.microsoft.com/office/powerpoint/2012/main"/>
+      <p15:sldGuideLst xmlns:p15="http://schemas.microsoft.com/office/powerpoint/2012/main" xmlns=""/>
     </p:ext>
   </p:extLst>
 </p:presentation>
@@ -139,7 +140,7 @@
           <p:cNvPr id="2" name="제목 1">
             <a:extLst>
               <a:ext uri="{FF2B5EF4-FFF2-40B4-BE49-F238E27FC236}">
-                <a16:creationId xmlns="" xmlns:a16="http://schemas.microsoft.com/office/drawing/2014/main" id="{3D1A3AD3-7BCD-49D7-804B-385FA13955DF}"/>
+                <a16:creationId xmlns:a16="http://schemas.microsoft.com/office/drawing/2014/main" xmlns="" id="{3D1A3AD3-7BCD-49D7-804B-385FA13955DF}"/>
               </a:ext>
             </a:extLst>
           </p:cNvPr>
@@ -176,7 +177,7 @@
           <p:cNvPr id="3" name="부제목 2">
             <a:extLst>
               <a:ext uri="{FF2B5EF4-FFF2-40B4-BE49-F238E27FC236}">
-                <a16:creationId xmlns="" xmlns:a16="http://schemas.microsoft.com/office/drawing/2014/main" id="{F5C52B03-FB73-451B-A273-D03BC6F9F42B}"/>
+                <a16:creationId xmlns:a16="http://schemas.microsoft.com/office/drawing/2014/main" xmlns="" id="{F5C52B03-FB73-451B-A273-D03BC6F9F42B}"/>
               </a:ext>
             </a:extLst>
           </p:cNvPr>
@@ -246,7 +247,7 @@
           <p:cNvPr id="4" name="날짜 개체 틀 3">
             <a:extLst>
               <a:ext uri="{FF2B5EF4-FFF2-40B4-BE49-F238E27FC236}">
-                <a16:creationId xmlns="" xmlns:a16="http://schemas.microsoft.com/office/drawing/2014/main" id="{6E3E358A-EC1B-4BD3-B78A-08DB2F125B0B}"/>
+                <a16:creationId xmlns:a16="http://schemas.microsoft.com/office/drawing/2014/main" xmlns="" id="{6E3E358A-EC1B-4BD3-B78A-08DB2F125B0B}"/>
               </a:ext>
             </a:extLst>
           </p:cNvPr>
@@ -264,7 +265,7 @@
           <a:p>
             <a:fld id="{41E50B39-36CB-473D-9E71-EE56FA41E00B}" type="datetimeFigureOut">
               <a:rPr lang="ko-KR" altLang="en-US" smtClean="0"/>
-              <a:t>2019-09-06</a:t>
+              <a:t>2019-09-09</a:t>
             </a:fld>
             <a:endParaRPr lang="ko-KR" altLang="en-US"/>
           </a:p>
@@ -275,7 +276,7 @@
           <p:cNvPr id="5" name="바닥글 개체 틀 4">
             <a:extLst>
               <a:ext uri="{FF2B5EF4-FFF2-40B4-BE49-F238E27FC236}">
-                <a16:creationId xmlns="" xmlns:a16="http://schemas.microsoft.com/office/drawing/2014/main" id="{EF93075B-0CC0-44E8-A08B-86E6BB09F5B9}"/>
+                <a16:creationId xmlns:a16="http://schemas.microsoft.com/office/drawing/2014/main" xmlns="" id="{EF93075B-0CC0-44E8-A08B-86E6BB09F5B9}"/>
               </a:ext>
             </a:extLst>
           </p:cNvPr>
@@ -300,7 +301,7 @@
           <p:cNvPr id="6" name="슬라이드 번호 개체 틀 5">
             <a:extLst>
               <a:ext uri="{FF2B5EF4-FFF2-40B4-BE49-F238E27FC236}">
-                <a16:creationId xmlns="" xmlns:a16="http://schemas.microsoft.com/office/drawing/2014/main" id="{FF3DEFA5-4A1F-40BC-8ED8-BB97F80EF3C7}"/>
+                <a16:creationId xmlns:a16="http://schemas.microsoft.com/office/drawing/2014/main" xmlns="" id="{FF3DEFA5-4A1F-40BC-8ED8-BB97F80EF3C7}"/>
               </a:ext>
             </a:extLst>
           </p:cNvPr>
@@ -359,7 +360,7 @@
           <p:cNvPr id="2" name="제목 1">
             <a:extLst>
               <a:ext uri="{FF2B5EF4-FFF2-40B4-BE49-F238E27FC236}">
-                <a16:creationId xmlns="" xmlns:a16="http://schemas.microsoft.com/office/drawing/2014/main" id="{327E3389-BE89-4312-87F6-BC8B12CE7EFB}"/>
+                <a16:creationId xmlns:a16="http://schemas.microsoft.com/office/drawing/2014/main" xmlns="" id="{327E3389-BE89-4312-87F6-BC8B12CE7EFB}"/>
               </a:ext>
             </a:extLst>
           </p:cNvPr>
@@ -387,7 +388,7 @@
           <p:cNvPr id="3" name="세로 텍스트 개체 틀 2">
             <a:extLst>
               <a:ext uri="{FF2B5EF4-FFF2-40B4-BE49-F238E27FC236}">
-                <a16:creationId xmlns="" xmlns:a16="http://schemas.microsoft.com/office/drawing/2014/main" id="{481BAA17-72BF-406A-8E34-EAD12F848803}"/>
+                <a16:creationId xmlns:a16="http://schemas.microsoft.com/office/drawing/2014/main" xmlns="" id="{481BAA17-72BF-406A-8E34-EAD12F848803}"/>
               </a:ext>
             </a:extLst>
           </p:cNvPr>
@@ -444,7 +445,7 @@
           <p:cNvPr id="4" name="날짜 개체 틀 3">
             <a:extLst>
               <a:ext uri="{FF2B5EF4-FFF2-40B4-BE49-F238E27FC236}">
-                <a16:creationId xmlns="" xmlns:a16="http://schemas.microsoft.com/office/drawing/2014/main" id="{80FD3D17-973F-4FC2-BE47-1E5D6923F2DE}"/>
+                <a16:creationId xmlns:a16="http://schemas.microsoft.com/office/drawing/2014/main" xmlns="" id="{80FD3D17-973F-4FC2-BE47-1E5D6923F2DE}"/>
               </a:ext>
             </a:extLst>
           </p:cNvPr>
@@ -462,7 +463,7 @@
           <a:p>
             <a:fld id="{41E50B39-36CB-473D-9E71-EE56FA41E00B}" type="datetimeFigureOut">
               <a:rPr lang="ko-KR" altLang="en-US" smtClean="0"/>
-              <a:t>2019-09-06</a:t>
+              <a:t>2019-09-09</a:t>
             </a:fld>
             <a:endParaRPr lang="ko-KR" altLang="en-US"/>
           </a:p>
@@ -473,7 +474,7 @@
           <p:cNvPr id="5" name="바닥글 개체 틀 4">
             <a:extLst>
               <a:ext uri="{FF2B5EF4-FFF2-40B4-BE49-F238E27FC236}">
-                <a16:creationId xmlns="" xmlns:a16="http://schemas.microsoft.com/office/drawing/2014/main" id="{79DFE74C-58C4-4C79-A679-C7BC48E39E26}"/>
+                <a16:creationId xmlns:a16="http://schemas.microsoft.com/office/drawing/2014/main" xmlns="" id="{79DFE74C-58C4-4C79-A679-C7BC48E39E26}"/>
               </a:ext>
             </a:extLst>
           </p:cNvPr>
@@ -498,7 +499,7 @@
           <p:cNvPr id="6" name="슬라이드 번호 개체 틀 5">
             <a:extLst>
               <a:ext uri="{FF2B5EF4-FFF2-40B4-BE49-F238E27FC236}">
-                <a16:creationId xmlns="" xmlns:a16="http://schemas.microsoft.com/office/drawing/2014/main" id="{8F224C1E-F0B2-408B-A595-F575328B6426}"/>
+                <a16:creationId xmlns:a16="http://schemas.microsoft.com/office/drawing/2014/main" xmlns="" id="{8F224C1E-F0B2-408B-A595-F575328B6426}"/>
               </a:ext>
             </a:extLst>
           </p:cNvPr>
@@ -557,7 +558,7 @@
           <p:cNvPr id="2" name="세로 제목 1">
             <a:extLst>
               <a:ext uri="{FF2B5EF4-FFF2-40B4-BE49-F238E27FC236}">
-                <a16:creationId xmlns="" xmlns:a16="http://schemas.microsoft.com/office/drawing/2014/main" id="{0B65A72A-06E4-4D3C-9273-85342B48F0C3}"/>
+                <a16:creationId xmlns:a16="http://schemas.microsoft.com/office/drawing/2014/main" xmlns="" id="{0B65A72A-06E4-4D3C-9273-85342B48F0C3}"/>
               </a:ext>
             </a:extLst>
           </p:cNvPr>
@@ -590,7 +591,7 @@
           <p:cNvPr id="3" name="세로 텍스트 개체 틀 2">
             <a:extLst>
               <a:ext uri="{FF2B5EF4-FFF2-40B4-BE49-F238E27FC236}">
-                <a16:creationId xmlns="" xmlns:a16="http://schemas.microsoft.com/office/drawing/2014/main" id="{190F74F9-3FC4-433C-BEB2-1DB05AD0B7A0}"/>
+                <a16:creationId xmlns:a16="http://schemas.microsoft.com/office/drawing/2014/main" xmlns="" id="{190F74F9-3FC4-433C-BEB2-1DB05AD0B7A0}"/>
               </a:ext>
             </a:extLst>
           </p:cNvPr>
@@ -652,7 +653,7 @@
           <p:cNvPr id="4" name="날짜 개체 틀 3">
             <a:extLst>
               <a:ext uri="{FF2B5EF4-FFF2-40B4-BE49-F238E27FC236}">
-                <a16:creationId xmlns="" xmlns:a16="http://schemas.microsoft.com/office/drawing/2014/main" id="{D14A3350-A719-4BC3-B977-2E8ED1057AEB}"/>
+                <a16:creationId xmlns:a16="http://schemas.microsoft.com/office/drawing/2014/main" xmlns="" id="{D14A3350-A719-4BC3-B977-2E8ED1057AEB}"/>
               </a:ext>
             </a:extLst>
           </p:cNvPr>
@@ -670,7 +671,7 @@
           <a:p>
             <a:fld id="{41E50B39-36CB-473D-9E71-EE56FA41E00B}" type="datetimeFigureOut">
               <a:rPr lang="ko-KR" altLang="en-US" smtClean="0"/>
-              <a:t>2019-09-06</a:t>
+              <a:t>2019-09-09</a:t>
             </a:fld>
             <a:endParaRPr lang="ko-KR" altLang="en-US"/>
           </a:p>
@@ -681,7 +682,7 @@
           <p:cNvPr id="5" name="바닥글 개체 틀 4">
             <a:extLst>
               <a:ext uri="{FF2B5EF4-FFF2-40B4-BE49-F238E27FC236}">
-                <a16:creationId xmlns="" xmlns:a16="http://schemas.microsoft.com/office/drawing/2014/main" id="{015641B4-57B0-4921-A2F4-C25A7EE9DB00}"/>
+                <a16:creationId xmlns:a16="http://schemas.microsoft.com/office/drawing/2014/main" xmlns="" id="{015641B4-57B0-4921-A2F4-C25A7EE9DB00}"/>
               </a:ext>
             </a:extLst>
           </p:cNvPr>
@@ -706,7 +707,7 @@
           <p:cNvPr id="6" name="슬라이드 번호 개체 틀 5">
             <a:extLst>
               <a:ext uri="{FF2B5EF4-FFF2-40B4-BE49-F238E27FC236}">
-                <a16:creationId xmlns="" xmlns:a16="http://schemas.microsoft.com/office/drawing/2014/main" id="{8286DF87-29F8-4347-9660-962046A57850}"/>
+                <a16:creationId xmlns:a16="http://schemas.microsoft.com/office/drawing/2014/main" xmlns="" id="{8286DF87-29F8-4347-9660-962046A57850}"/>
               </a:ext>
             </a:extLst>
           </p:cNvPr>
@@ -765,7 +766,7 @@
           <p:cNvPr id="2" name="제목 1">
             <a:extLst>
               <a:ext uri="{FF2B5EF4-FFF2-40B4-BE49-F238E27FC236}">
-                <a16:creationId xmlns="" xmlns:a16="http://schemas.microsoft.com/office/drawing/2014/main" id="{804A95AC-9042-457F-A8E7-AFA2394F7C2D}"/>
+                <a16:creationId xmlns:a16="http://schemas.microsoft.com/office/drawing/2014/main" xmlns="" id="{804A95AC-9042-457F-A8E7-AFA2394F7C2D}"/>
               </a:ext>
             </a:extLst>
           </p:cNvPr>
@@ -793,7 +794,7 @@
           <p:cNvPr id="3" name="내용 개체 틀 2">
             <a:extLst>
               <a:ext uri="{FF2B5EF4-FFF2-40B4-BE49-F238E27FC236}">
-                <a16:creationId xmlns="" xmlns:a16="http://schemas.microsoft.com/office/drawing/2014/main" id="{8033AF79-20C1-49D7-94BB-CAA928415B7B}"/>
+                <a16:creationId xmlns:a16="http://schemas.microsoft.com/office/drawing/2014/main" xmlns="" id="{8033AF79-20C1-49D7-94BB-CAA928415B7B}"/>
               </a:ext>
             </a:extLst>
           </p:cNvPr>
@@ -850,7 +851,7 @@
           <p:cNvPr id="4" name="날짜 개체 틀 3">
             <a:extLst>
               <a:ext uri="{FF2B5EF4-FFF2-40B4-BE49-F238E27FC236}">
-                <a16:creationId xmlns="" xmlns:a16="http://schemas.microsoft.com/office/drawing/2014/main" id="{197F39FD-BB9B-4361-92F1-6D43D964BF55}"/>
+                <a16:creationId xmlns:a16="http://schemas.microsoft.com/office/drawing/2014/main" xmlns="" id="{197F39FD-BB9B-4361-92F1-6D43D964BF55}"/>
               </a:ext>
             </a:extLst>
           </p:cNvPr>
@@ -868,7 +869,7 @@
           <a:p>
             <a:fld id="{41E50B39-36CB-473D-9E71-EE56FA41E00B}" type="datetimeFigureOut">
               <a:rPr lang="ko-KR" altLang="en-US" smtClean="0"/>
-              <a:t>2019-09-06</a:t>
+              <a:t>2019-09-09</a:t>
             </a:fld>
             <a:endParaRPr lang="ko-KR" altLang="en-US"/>
           </a:p>
@@ -879,7 +880,7 @@
           <p:cNvPr id="5" name="바닥글 개체 틀 4">
             <a:extLst>
               <a:ext uri="{FF2B5EF4-FFF2-40B4-BE49-F238E27FC236}">
-                <a16:creationId xmlns="" xmlns:a16="http://schemas.microsoft.com/office/drawing/2014/main" id="{E1D0D12F-F3A4-44D7-AA10-03E5A6A66FC5}"/>
+                <a16:creationId xmlns:a16="http://schemas.microsoft.com/office/drawing/2014/main" xmlns="" id="{E1D0D12F-F3A4-44D7-AA10-03E5A6A66FC5}"/>
               </a:ext>
             </a:extLst>
           </p:cNvPr>
@@ -904,7 +905,7 @@
           <p:cNvPr id="6" name="슬라이드 번호 개체 틀 5">
             <a:extLst>
               <a:ext uri="{FF2B5EF4-FFF2-40B4-BE49-F238E27FC236}">
-                <a16:creationId xmlns="" xmlns:a16="http://schemas.microsoft.com/office/drawing/2014/main" id="{ED955E20-DA8C-423B-A117-95682554FAD7}"/>
+                <a16:creationId xmlns:a16="http://schemas.microsoft.com/office/drawing/2014/main" xmlns="" id="{ED955E20-DA8C-423B-A117-95682554FAD7}"/>
               </a:ext>
             </a:extLst>
           </p:cNvPr>
@@ -963,7 +964,7 @@
           <p:cNvPr id="2" name="제목 1">
             <a:extLst>
               <a:ext uri="{FF2B5EF4-FFF2-40B4-BE49-F238E27FC236}">
-                <a16:creationId xmlns="" xmlns:a16="http://schemas.microsoft.com/office/drawing/2014/main" id="{FB9D22DD-95BF-4275-B4FA-FCBD806B7D93}"/>
+                <a16:creationId xmlns:a16="http://schemas.microsoft.com/office/drawing/2014/main" xmlns="" id="{FB9D22DD-95BF-4275-B4FA-FCBD806B7D93}"/>
               </a:ext>
             </a:extLst>
           </p:cNvPr>
@@ -1000,7 +1001,7 @@
           <p:cNvPr id="3" name="텍스트 개체 틀 2">
             <a:extLst>
               <a:ext uri="{FF2B5EF4-FFF2-40B4-BE49-F238E27FC236}">
-                <a16:creationId xmlns="" xmlns:a16="http://schemas.microsoft.com/office/drawing/2014/main" id="{66C684A6-99BA-4DB9-AC60-4AFDBA496EF4}"/>
+                <a16:creationId xmlns:a16="http://schemas.microsoft.com/office/drawing/2014/main" xmlns="" id="{66C684A6-99BA-4DB9-AC60-4AFDBA496EF4}"/>
               </a:ext>
             </a:extLst>
           </p:cNvPr>
@@ -1125,7 +1126,7 @@
           <p:cNvPr id="4" name="날짜 개체 틀 3">
             <a:extLst>
               <a:ext uri="{FF2B5EF4-FFF2-40B4-BE49-F238E27FC236}">
-                <a16:creationId xmlns="" xmlns:a16="http://schemas.microsoft.com/office/drawing/2014/main" id="{72D5CC67-7232-4850-9D98-B2094C507518}"/>
+                <a16:creationId xmlns:a16="http://schemas.microsoft.com/office/drawing/2014/main" xmlns="" id="{72D5CC67-7232-4850-9D98-B2094C507518}"/>
               </a:ext>
             </a:extLst>
           </p:cNvPr>
@@ -1143,7 +1144,7 @@
           <a:p>
             <a:fld id="{41E50B39-36CB-473D-9E71-EE56FA41E00B}" type="datetimeFigureOut">
               <a:rPr lang="ko-KR" altLang="en-US" smtClean="0"/>
-              <a:t>2019-09-06</a:t>
+              <a:t>2019-09-09</a:t>
             </a:fld>
             <a:endParaRPr lang="ko-KR" altLang="en-US"/>
           </a:p>
@@ -1154,7 +1155,7 @@
           <p:cNvPr id="5" name="바닥글 개체 틀 4">
             <a:extLst>
               <a:ext uri="{FF2B5EF4-FFF2-40B4-BE49-F238E27FC236}">
-                <a16:creationId xmlns="" xmlns:a16="http://schemas.microsoft.com/office/drawing/2014/main" id="{CEA4DFDE-E0A0-4016-B828-6E13314DF622}"/>
+                <a16:creationId xmlns:a16="http://schemas.microsoft.com/office/drawing/2014/main" xmlns="" id="{CEA4DFDE-E0A0-4016-B828-6E13314DF622}"/>
               </a:ext>
             </a:extLst>
           </p:cNvPr>
@@ -1179,7 +1180,7 @@
           <p:cNvPr id="6" name="슬라이드 번호 개체 틀 5">
             <a:extLst>
               <a:ext uri="{FF2B5EF4-FFF2-40B4-BE49-F238E27FC236}">
-                <a16:creationId xmlns="" xmlns:a16="http://schemas.microsoft.com/office/drawing/2014/main" id="{707B6B3D-0258-49E5-A3FF-AC65F3DF5A30}"/>
+                <a16:creationId xmlns:a16="http://schemas.microsoft.com/office/drawing/2014/main" xmlns="" id="{707B6B3D-0258-49E5-A3FF-AC65F3DF5A30}"/>
               </a:ext>
             </a:extLst>
           </p:cNvPr>
@@ -1238,7 +1239,7 @@
           <p:cNvPr id="2" name="제목 1">
             <a:extLst>
               <a:ext uri="{FF2B5EF4-FFF2-40B4-BE49-F238E27FC236}">
-                <a16:creationId xmlns="" xmlns:a16="http://schemas.microsoft.com/office/drawing/2014/main" id="{4A722FE2-147E-45E4-8409-E0464CE6633E}"/>
+                <a16:creationId xmlns:a16="http://schemas.microsoft.com/office/drawing/2014/main" xmlns="" id="{4A722FE2-147E-45E4-8409-E0464CE6633E}"/>
               </a:ext>
             </a:extLst>
           </p:cNvPr>
@@ -1266,7 +1267,7 @@
           <p:cNvPr id="3" name="내용 개체 틀 2">
             <a:extLst>
               <a:ext uri="{FF2B5EF4-FFF2-40B4-BE49-F238E27FC236}">
-                <a16:creationId xmlns="" xmlns:a16="http://schemas.microsoft.com/office/drawing/2014/main" id="{2E0C6DE7-9D9C-4B42-87E1-455FF16150EB}"/>
+                <a16:creationId xmlns:a16="http://schemas.microsoft.com/office/drawing/2014/main" xmlns="" id="{2E0C6DE7-9D9C-4B42-87E1-455FF16150EB}"/>
               </a:ext>
             </a:extLst>
           </p:cNvPr>
@@ -1328,7 +1329,7 @@
           <p:cNvPr id="4" name="내용 개체 틀 3">
             <a:extLst>
               <a:ext uri="{FF2B5EF4-FFF2-40B4-BE49-F238E27FC236}">
-                <a16:creationId xmlns="" xmlns:a16="http://schemas.microsoft.com/office/drawing/2014/main" id="{C18085FC-288E-40DF-B6CB-D817C99C5162}"/>
+                <a16:creationId xmlns:a16="http://schemas.microsoft.com/office/drawing/2014/main" xmlns="" id="{C18085FC-288E-40DF-B6CB-D817C99C5162}"/>
               </a:ext>
             </a:extLst>
           </p:cNvPr>
@@ -1390,7 +1391,7 @@
           <p:cNvPr id="5" name="날짜 개체 틀 4">
             <a:extLst>
               <a:ext uri="{FF2B5EF4-FFF2-40B4-BE49-F238E27FC236}">
-                <a16:creationId xmlns="" xmlns:a16="http://schemas.microsoft.com/office/drawing/2014/main" id="{4C242424-4B85-4C0C-81DF-E42987001A69}"/>
+                <a16:creationId xmlns:a16="http://schemas.microsoft.com/office/drawing/2014/main" xmlns="" id="{4C242424-4B85-4C0C-81DF-E42987001A69}"/>
               </a:ext>
             </a:extLst>
           </p:cNvPr>
@@ -1408,7 +1409,7 @@
           <a:p>
             <a:fld id="{41E50B39-36CB-473D-9E71-EE56FA41E00B}" type="datetimeFigureOut">
               <a:rPr lang="ko-KR" altLang="en-US" smtClean="0"/>
-              <a:t>2019-09-06</a:t>
+              <a:t>2019-09-09</a:t>
             </a:fld>
             <a:endParaRPr lang="ko-KR" altLang="en-US"/>
           </a:p>
@@ -1419,7 +1420,7 @@
           <p:cNvPr id="6" name="바닥글 개체 틀 5">
             <a:extLst>
               <a:ext uri="{FF2B5EF4-FFF2-40B4-BE49-F238E27FC236}">
-                <a16:creationId xmlns="" xmlns:a16="http://schemas.microsoft.com/office/drawing/2014/main" id="{616EA257-1C4D-49F9-99AF-5F387AFECED2}"/>
+                <a16:creationId xmlns:a16="http://schemas.microsoft.com/office/drawing/2014/main" xmlns="" id="{616EA257-1C4D-49F9-99AF-5F387AFECED2}"/>
               </a:ext>
             </a:extLst>
           </p:cNvPr>
@@ -1444,7 +1445,7 @@
           <p:cNvPr id="7" name="슬라이드 번호 개체 틀 6">
             <a:extLst>
               <a:ext uri="{FF2B5EF4-FFF2-40B4-BE49-F238E27FC236}">
-                <a16:creationId xmlns="" xmlns:a16="http://schemas.microsoft.com/office/drawing/2014/main" id="{917B0E8A-36DD-4BAB-BB16-3ACC651B06DC}"/>
+                <a16:creationId xmlns:a16="http://schemas.microsoft.com/office/drawing/2014/main" xmlns="" id="{917B0E8A-36DD-4BAB-BB16-3ACC651B06DC}"/>
               </a:ext>
             </a:extLst>
           </p:cNvPr>
@@ -1503,7 +1504,7 @@
           <p:cNvPr id="2" name="제목 1">
             <a:extLst>
               <a:ext uri="{FF2B5EF4-FFF2-40B4-BE49-F238E27FC236}">
-                <a16:creationId xmlns="" xmlns:a16="http://schemas.microsoft.com/office/drawing/2014/main" id="{29B43E85-95B6-40EC-8910-111BAC39DE0C}"/>
+                <a16:creationId xmlns:a16="http://schemas.microsoft.com/office/drawing/2014/main" xmlns="" id="{29B43E85-95B6-40EC-8910-111BAC39DE0C}"/>
               </a:ext>
             </a:extLst>
           </p:cNvPr>
@@ -1536,7 +1537,7 @@
           <p:cNvPr id="3" name="텍스트 개체 틀 2">
             <a:extLst>
               <a:ext uri="{FF2B5EF4-FFF2-40B4-BE49-F238E27FC236}">
-                <a16:creationId xmlns="" xmlns:a16="http://schemas.microsoft.com/office/drawing/2014/main" id="{D1A1242D-05EC-4A00-BF24-849128E5E2C6}"/>
+                <a16:creationId xmlns:a16="http://schemas.microsoft.com/office/drawing/2014/main" xmlns="" id="{D1A1242D-05EC-4A00-BF24-849128E5E2C6}"/>
               </a:ext>
             </a:extLst>
           </p:cNvPr>
@@ -1607,7 +1608,7 @@
           <p:cNvPr id="4" name="내용 개체 틀 3">
             <a:extLst>
               <a:ext uri="{FF2B5EF4-FFF2-40B4-BE49-F238E27FC236}">
-                <a16:creationId xmlns="" xmlns:a16="http://schemas.microsoft.com/office/drawing/2014/main" id="{C9809E00-C383-44C4-87CA-E2ED88FE071B}"/>
+                <a16:creationId xmlns:a16="http://schemas.microsoft.com/office/drawing/2014/main" xmlns="" id="{C9809E00-C383-44C4-87CA-E2ED88FE071B}"/>
               </a:ext>
             </a:extLst>
           </p:cNvPr>
@@ -1669,7 +1670,7 @@
           <p:cNvPr id="5" name="텍스트 개체 틀 4">
             <a:extLst>
               <a:ext uri="{FF2B5EF4-FFF2-40B4-BE49-F238E27FC236}">
-                <a16:creationId xmlns="" xmlns:a16="http://schemas.microsoft.com/office/drawing/2014/main" id="{81F39A9B-5F9E-402A-B33D-9DE599D25948}"/>
+                <a16:creationId xmlns:a16="http://schemas.microsoft.com/office/drawing/2014/main" xmlns="" id="{81F39A9B-5F9E-402A-B33D-9DE599D25948}"/>
               </a:ext>
             </a:extLst>
           </p:cNvPr>
@@ -1740,7 +1741,7 @@
           <p:cNvPr id="6" name="내용 개체 틀 5">
             <a:extLst>
               <a:ext uri="{FF2B5EF4-FFF2-40B4-BE49-F238E27FC236}">
-                <a16:creationId xmlns="" xmlns:a16="http://schemas.microsoft.com/office/drawing/2014/main" id="{A0CA64DE-CB87-4E97-A0A5-EA110C43F5E0}"/>
+                <a16:creationId xmlns:a16="http://schemas.microsoft.com/office/drawing/2014/main" xmlns="" id="{A0CA64DE-CB87-4E97-A0A5-EA110C43F5E0}"/>
               </a:ext>
             </a:extLst>
           </p:cNvPr>
@@ -1802,7 +1803,7 @@
           <p:cNvPr id="7" name="날짜 개체 틀 6">
             <a:extLst>
               <a:ext uri="{FF2B5EF4-FFF2-40B4-BE49-F238E27FC236}">
-                <a16:creationId xmlns="" xmlns:a16="http://schemas.microsoft.com/office/drawing/2014/main" id="{03434EDD-7728-4D51-8CA4-3A2543C4189D}"/>
+                <a16:creationId xmlns:a16="http://schemas.microsoft.com/office/drawing/2014/main" xmlns="" id="{03434EDD-7728-4D51-8CA4-3A2543C4189D}"/>
               </a:ext>
             </a:extLst>
           </p:cNvPr>
@@ -1820,7 +1821,7 @@
           <a:p>
             <a:fld id="{41E50B39-36CB-473D-9E71-EE56FA41E00B}" type="datetimeFigureOut">
               <a:rPr lang="ko-KR" altLang="en-US" smtClean="0"/>
-              <a:t>2019-09-06</a:t>
+              <a:t>2019-09-09</a:t>
             </a:fld>
             <a:endParaRPr lang="ko-KR" altLang="en-US"/>
           </a:p>
@@ -1831,7 +1832,7 @@
           <p:cNvPr id="8" name="바닥글 개체 틀 7">
             <a:extLst>
               <a:ext uri="{FF2B5EF4-FFF2-40B4-BE49-F238E27FC236}">
-                <a16:creationId xmlns="" xmlns:a16="http://schemas.microsoft.com/office/drawing/2014/main" id="{9F598D92-2C34-4E6F-8FDA-93EF168C3822}"/>
+                <a16:creationId xmlns:a16="http://schemas.microsoft.com/office/drawing/2014/main" xmlns="" id="{9F598D92-2C34-4E6F-8FDA-93EF168C3822}"/>
               </a:ext>
             </a:extLst>
           </p:cNvPr>
@@ -1856,7 +1857,7 @@
           <p:cNvPr id="9" name="슬라이드 번호 개체 틀 8">
             <a:extLst>
               <a:ext uri="{FF2B5EF4-FFF2-40B4-BE49-F238E27FC236}">
-                <a16:creationId xmlns="" xmlns:a16="http://schemas.microsoft.com/office/drawing/2014/main" id="{17FB2C98-96B9-4ADB-B007-4E34B1F163E3}"/>
+                <a16:creationId xmlns:a16="http://schemas.microsoft.com/office/drawing/2014/main" xmlns="" id="{17FB2C98-96B9-4ADB-B007-4E34B1F163E3}"/>
               </a:ext>
             </a:extLst>
           </p:cNvPr>
@@ -1915,7 +1916,7 @@
           <p:cNvPr id="2" name="제목 1">
             <a:extLst>
               <a:ext uri="{FF2B5EF4-FFF2-40B4-BE49-F238E27FC236}">
-                <a16:creationId xmlns="" xmlns:a16="http://schemas.microsoft.com/office/drawing/2014/main" id="{BD80F177-D57C-4BBA-A886-40AFD7B259CA}"/>
+                <a16:creationId xmlns:a16="http://schemas.microsoft.com/office/drawing/2014/main" xmlns="" id="{BD80F177-D57C-4BBA-A886-40AFD7B259CA}"/>
               </a:ext>
             </a:extLst>
           </p:cNvPr>
@@ -1943,7 +1944,7 @@
           <p:cNvPr id="3" name="날짜 개체 틀 2">
             <a:extLst>
               <a:ext uri="{FF2B5EF4-FFF2-40B4-BE49-F238E27FC236}">
-                <a16:creationId xmlns="" xmlns:a16="http://schemas.microsoft.com/office/drawing/2014/main" id="{D0B1443B-FE49-4488-B876-4DE38B5AF7CE}"/>
+                <a16:creationId xmlns:a16="http://schemas.microsoft.com/office/drawing/2014/main" xmlns="" id="{D0B1443B-FE49-4488-B876-4DE38B5AF7CE}"/>
               </a:ext>
             </a:extLst>
           </p:cNvPr>
@@ -1961,7 +1962,7 @@
           <a:p>
             <a:fld id="{41E50B39-36CB-473D-9E71-EE56FA41E00B}" type="datetimeFigureOut">
               <a:rPr lang="ko-KR" altLang="en-US" smtClean="0"/>
-              <a:t>2019-09-06</a:t>
+              <a:t>2019-09-09</a:t>
             </a:fld>
             <a:endParaRPr lang="ko-KR" altLang="en-US"/>
           </a:p>
@@ -1972,7 +1973,7 @@
           <p:cNvPr id="4" name="바닥글 개체 틀 3">
             <a:extLst>
               <a:ext uri="{FF2B5EF4-FFF2-40B4-BE49-F238E27FC236}">
-                <a16:creationId xmlns="" xmlns:a16="http://schemas.microsoft.com/office/drawing/2014/main" id="{F1F45E66-34D2-49AB-87F1-D58CC88C77C8}"/>
+                <a16:creationId xmlns:a16="http://schemas.microsoft.com/office/drawing/2014/main" xmlns="" id="{F1F45E66-34D2-49AB-87F1-D58CC88C77C8}"/>
               </a:ext>
             </a:extLst>
           </p:cNvPr>
@@ -1997,7 +1998,7 @@
           <p:cNvPr id="5" name="슬라이드 번호 개체 틀 4">
             <a:extLst>
               <a:ext uri="{FF2B5EF4-FFF2-40B4-BE49-F238E27FC236}">
-                <a16:creationId xmlns="" xmlns:a16="http://schemas.microsoft.com/office/drawing/2014/main" id="{C678D6F1-C163-420A-9622-EA603250E282}"/>
+                <a16:creationId xmlns:a16="http://schemas.microsoft.com/office/drawing/2014/main" xmlns="" id="{C678D6F1-C163-420A-9622-EA603250E282}"/>
               </a:ext>
             </a:extLst>
           </p:cNvPr>
@@ -2056,7 +2057,7 @@
           <p:cNvPr id="2" name="날짜 개체 틀 1">
             <a:extLst>
               <a:ext uri="{FF2B5EF4-FFF2-40B4-BE49-F238E27FC236}">
-                <a16:creationId xmlns="" xmlns:a16="http://schemas.microsoft.com/office/drawing/2014/main" id="{92D41D07-4E44-49A3-997E-C161FA8810A6}"/>
+                <a16:creationId xmlns:a16="http://schemas.microsoft.com/office/drawing/2014/main" xmlns="" id="{92D41D07-4E44-49A3-997E-C161FA8810A6}"/>
               </a:ext>
             </a:extLst>
           </p:cNvPr>
@@ -2074,7 +2075,7 @@
           <a:p>
             <a:fld id="{41E50B39-36CB-473D-9E71-EE56FA41E00B}" type="datetimeFigureOut">
               <a:rPr lang="ko-KR" altLang="en-US" smtClean="0"/>
-              <a:t>2019-09-06</a:t>
+              <a:t>2019-09-09</a:t>
             </a:fld>
             <a:endParaRPr lang="ko-KR" altLang="en-US"/>
           </a:p>
@@ -2085,7 +2086,7 @@
           <p:cNvPr id="3" name="바닥글 개체 틀 2">
             <a:extLst>
               <a:ext uri="{FF2B5EF4-FFF2-40B4-BE49-F238E27FC236}">
-                <a16:creationId xmlns="" xmlns:a16="http://schemas.microsoft.com/office/drawing/2014/main" id="{89DDB7C3-C6D8-43A5-A972-262D6BB0C61E}"/>
+                <a16:creationId xmlns:a16="http://schemas.microsoft.com/office/drawing/2014/main" xmlns="" id="{89DDB7C3-C6D8-43A5-A972-262D6BB0C61E}"/>
               </a:ext>
             </a:extLst>
           </p:cNvPr>
@@ -2110,7 +2111,7 @@
           <p:cNvPr id="4" name="슬라이드 번호 개체 틀 3">
             <a:extLst>
               <a:ext uri="{FF2B5EF4-FFF2-40B4-BE49-F238E27FC236}">
-                <a16:creationId xmlns="" xmlns:a16="http://schemas.microsoft.com/office/drawing/2014/main" id="{CDED90EE-D8AB-4290-A809-578B4329ADCC}"/>
+                <a16:creationId xmlns:a16="http://schemas.microsoft.com/office/drawing/2014/main" xmlns="" id="{CDED90EE-D8AB-4290-A809-578B4329ADCC}"/>
               </a:ext>
             </a:extLst>
           </p:cNvPr>
@@ -2169,7 +2170,7 @@
           <p:cNvPr id="2" name="제목 1">
             <a:extLst>
               <a:ext uri="{FF2B5EF4-FFF2-40B4-BE49-F238E27FC236}">
-                <a16:creationId xmlns="" xmlns:a16="http://schemas.microsoft.com/office/drawing/2014/main" id="{3893E68B-476A-475E-B1B2-588779116E66}"/>
+                <a16:creationId xmlns:a16="http://schemas.microsoft.com/office/drawing/2014/main" xmlns="" id="{3893E68B-476A-475E-B1B2-588779116E66}"/>
               </a:ext>
             </a:extLst>
           </p:cNvPr>
@@ -2206,7 +2207,7 @@
           <p:cNvPr id="3" name="내용 개체 틀 2">
             <a:extLst>
               <a:ext uri="{FF2B5EF4-FFF2-40B4-BE49-F238E27FC236}">
-                <a16:creationId xmlns="" xmlns:a16="http://schemas.microsoft.com/office/drawing/2014/main" id="{0D039BA0-9A00-4AC8-865F-3E7FDDFFC1D4}"/>
+                <a16:creationId xmlns:a16="http://schemas.microsoft.com/office/drawing/2014/main" xmlns="" id="{0D039BA0-9A00-4AC8-865F-3E7FDDFFC1D4}"/>
               </a:ext>
             </a:extLst>
           </p:cNvPr>
@@ -2296,7 +2297,7 @@
           <p:cNvPr id="4" name="텍스트 개체 틀 3">
             <a:extLst>
               <a:ext uri="{FF2B5EF4-FFF2-40B4-BE49-F238E27FC236}">
-                <a16:creationId xmlns="" xmlns:a16="http://schemas.microsoft.com/office/drawing/2014/main" id="{F719ED72-BBB9-4F7E-9E14-C4C0FC550D64}"/>
+                <a16:creationId xmlns:a16="http://schemas.microsoft.com/office/drawing/2014/main" xmlns="" id="{F719ED72-BBB9-4F7E-9E14-C4C0FC550D64}"/>
               </a:ext>
             </a:extLst>
           </p:cNvPr>
@@ -2367,7 +2368,7 @@
           <p:cNvPr id="5" name="날짜 개체 틀 4">
             <a:extLst>
               <a:ext uri="{FF2B5EF4-FFF2-40B4-BE49-F238E27FC236}">
-                <a16:creationId xmlns="" xmlns:a16="http://schemas.microsoft.com/office/drawing/2014/main" id="{11E986D2-62B3-4962-A4C5-0F7E5739769B}"/>
+                <a16:creationId xmlns:a16="http://schemas.microsoft.com/office/drawing/2014/main" xmlns="" id="{11E986D2-62B3-4962-A4C5-0F7E5739769B}"/>
               </a:ext>
             </a:extLst>
           </p:cNvPr>
@@ -2385,7 +2386,7 @@
           <a:p>
             <a:fld id="{41E50B39-36CB-473D-9E71-EE56FA41E00B}" type="datetimeFigureOut">
               <a:rPr lang="ko-KR" altLang="en-US" smtClean="0"/>
-              <a:t>2019-09-06</a:t>
+              <a:t>2019-09-09</a:t>
             </a:fld>
             <a:endParaRPr lang="ko-KR" altLang="en-US"/>
           </a:p>
@@ -2396,7 +2397,7 @@
           <p:cNvPr id="6" name="바닥글 개체 틀 5">
             <a:extLst>
               <a:ext uri="{FF2B5EF4-FFF2-40B4-BE49-F238E27FC236}">
-                <a16:creationId xmlns="" xmlns:a16="http://schemas.microsoft.com/office/drawing/2014/main" id="{D63939F4-7103-4849-8638-09DA90E46398}"/>
+                <a16:creationId xmlns:a16="http://schemas.microsoft.com/office/drawing/2014/main" xmlns="" id="{D63939F4-7103-4849-8638-09DA90E46398}"/>
               </a:ext>
             </a:extLst>
           </p:cNvPr>
@@ -2421,7 +2422,7 @@
           <p:cNvPr id="7" name="슬라이드 번호 개체 틀 6">
             <a:extLst>
               <a:ext uri="{FF2B5EF4-FFF2-40B4-BE49-F238E27FC236}">
-                <a16:creationId xmlns="" xmlns:a16="http://schemas.microsoft.com/office/drawing/2014/main" id="{098EC449-CFFD-44D2-B500-26EA77420254}"/>
+                <a16:creationId xmlns:a16="http://schemas.microsoft.com/office/drawing/2014/main" xmlns="" id="{098EC449-CFFD-44D2-B500-26EA77420254}"/>
               </a:ext>
             </a:extLst>
           </p:cNvPr>
@@ -2480,7 +2481,7 @@
           <p:cNvPr id="2" name="제목 1">
             <a:extLst>
               <a:ext uri="{FF2B5EF4-FFF2-40B4-BE49-F238E27FC236}">
-                <a16:creationId xmlns="" xmlns:a16="http://schemas.microsoft.com/office/drawing/2014/main" id="{2C9A1811-9BBE-4ADF-82AC-1D1097F8758E}"/>
+                <a16:creationId xmlns:a16="http://schemas.microsoft.com/office/drawing/2014/main" xmlns="" id="{2C9A1811-9BBE-4ADF-82AC-1D1097F8758E}"/>
               </a:ext>
             </a:extLst>
           </p:cNvPr>
@@ -2517,7 +2518,7 @@
           <p:cNvPr id="3" name="그림 개체 틀 2">
             <a:extLst>
               <a:ext uri="{FF2B5EF4-FFF2-40B4-BE49-F238E27FC236}">
-                <a16:creationId xmlns="" xmlns:a16="http://schemas.microsoft.com/office/drawing/2014/main" id="{ADDEE001-5C76-422B-B4A7-C7C6D37A2698}"/>
+                <a16:creationId xmlns:a16="http://schemas.microsoft.com/office/drawing/2014/main" xmlns="" id="{ADDEE001-5C76-422B-B4A7-C7C6D37A2698}"/>
               </a:ext>
             </a:extLst>
           </p:cNvPr>
@@ -2584,7 +2585,7 @@
           <p:cNvPr id="4" name="텍스트 개체 틀 3">
             <a:extLst>
               <a:ext uri="{FF2B5EF4-FFF2-40B4-BE49-F238E27FC236}">
-                <a16:creationId xmlns="" xmlns:a16="http://schemas.microsoft.com/office/drawing/2014/main" id="{8E44C801-BCAC-4F58-A415-336E3AA59B87}"/>
+                <a16:creationId xmlns:a16="http://schemas.microsoft.com/office/drawing/2014/main" xmlns="" id="{8E44C801-BCAC-4F58-A415-336E3AA59B87}"/>
               </a:ext>
             </a:extLst>
           </p:cNvPr>
@@ -2655,7 +2656,7 @@
           <p:cNvPr id="5" name="날짜 개체 틀 4">
             <a:extLst>
               <a:ext uri="{FF2B5EF4-FFF2-40B4-BE49-F238E27FC236}">
-                <a16:creationId xmlns="" xmlns:a16="http://schemas.microsoft.com/office/drawing/2014/main" id="{C41F8177-4065-4F5A-A8E3-224B22077152}"/>
+                <a16:creationId xmlns:a16="http://schemas.microsoft.com/office/drawing/2014/main" xmlns="" id="{C41F8177-4065-4F5A-A8E3-224B22077152}"/>
               </a:ext>
             </a:extLst>
           </p:cNvPr>
@@ -2673,7 +2674,7 @@
           <a:p>
             <a:fld id="{41E50B39-36CB-473D-9E71-EE56FA41E00B}" type="datetimeFigureOut">
               <a:rPr lang="ko-KR" altLang="en-US" smtClean="0"/>
-              <a:t>2019-09-06</a:t>
+              <a:t>2019-09-09</a:t>
             </a:fld>
             <a:endParaRPr lang="ko-KR" altLang="en-US"/>
           </a:p>
@@ -2684,7 +2685,7 @@
           <p:cNvPr id="6" name="바닥글 개체 틀 5">
             <a:extLst>
               <a:ext uri="{FF2B5EF4-FFF2-40B4-BE49-F238E27FC236}">
-                <a16:creationId xmlns="" xmlns:a16="http://schemas.microsoft.com/office/drawing/2014/main" id="{61DB5452-A605-46FE-B4F4-0BF483A07E90}"/>
+                <a16:creationId xmlns:a16="http://schemas.microsoft.com/office/drawing/2014/main" xmlns="" id="{61DB5452-A605-46FE-B4F4-0BF483A07E90}"/>
               </a:ext>
             </a:extLst>
           </p:cNvPr>
@@ -2709,7 +2710,7 @@
           <p:cNvPr id="7" name="슬라이드 번호 개체 틀 6">
             <a:extLst>
               <a:ext uri="{FF2B5EF4-FFF2-40B4-BE49-F238E27FC236}">
-                <a16:creationId xmlns="" xmlns:a16="http://schemas.microsoft.com/office/drawing/2014/main" id="{33990A57-1FD1-4127-A060-470EA3650AB6}"/>
+                <a16:creationId xmlns:a16="http://schemas.microsoft.com/office/drawing/2014/main" xmlns="" id="{33990A57-1FD1-4127-A060-470EA3650AB6}"/>
               </a:ext>
             </a:extLst>
           </p:cNvPr>
@@ -2773,7 +2774,7 @@
           <p:cNvPr id="2" name="제목 개체 틀 1">
             <a:extLst>
               <a:ext uri="{FF2B5EF4-FFF2-40B4-BE49-F238E27FC236}">
-                <a16:creationId xmlns="" xmlns:a16="http://schemas.microsoft.com/office/drawing/2014/main" id="{033A5AB6-3329-4371-827D-DA0B9548051C}"/>
+                <a16:creationId xmlns:a16="http://schemas.microsoft.com/office/drawing/2014/main" xmlns="" id="{033A5AB6-3329-4371-827D-DA0B9548051C}"/>
               </a:ext>
             </a:extLst>
           </p:cNvPr>
@@ -2811,7 +2812,7 @@
           <p:cNvPr id="3" name="텍스트 개체 틀 2">
             <a:extLst>
               <a:ext uri="{FF2B5EF4-FFF2-40B4-BE49-F238E27FC236}">
-                <a16:creationId xmlns="" xmlns:a16="http://schemas.microsoft.com/office/drawing/2014/main" id="{6687BD0C-A3F6-402B-B325-6332ECDF2CED}"/>
+                <a16:creationId xmlns:a16="http://schemas.microsoft.com/office/drawing/2014/main" xmlns="" id="{6687BD0C-A3F6-402B-B325-6332ECDF2CED}"/>
               </a:ext>
             </a:extLst>
           </p:cNvPr>
@@ -2878,7 +2879,7 @@
           <p:cNvPr id="4" name="날짜 개체 틀 3">
             <a:extLst>
               <a:ext uri="{FF2B5EF4-FFF2-40B4-BE49-F238E27FC236}">
-                <a16:creationId xmlns="" xmlns:a16="http://schemas.microsoft.com/office/drawing/2014/main" id="{A5C55C3D-7ED3-4FCC-804F-FE1E30B2621C}"/>
+                <a16:creationId xmlns:a16="http://schemas.microsoft.com/office/drawing/2014/main" xmlns="" id="{A5C55C3D-7ED3-4FCC-804F-FE1E30B2621C}"/>
               </a:ext>
             </a:extLst>
           </p:cNvPr>
@@ -2914,7 +2915,7 @@
           <a:p>
             <a:fld id="{41E50B39-36CB-473D-9E71-EE56FA41E00B}" type="datetimeFigureOut">
               <a:rPr lang="ko-KR" altLang="en-US" smtClean="0"/>
-              <a:t>2019-09-06</a:t>
+              <a:t>2019-09-09</a:t>
             </a:fld>
             <a:endParaRPr lang="ko-KR" altLang="en-US"/>
           </a:p>
@@ -2925,7 +2926,7 @@
           <p:cNvPr id="5" name="바닥글 개체 틀 4">
             <a:extLst>
               <a:ext uri="{FF2B5EF4-FFF2-40B4-BE49-F238E27FC236}">
-                <a16:creationId xmlns="" xmlns:a16="http://schemas.microsoft.com/office/drawing/2014/main" id="{9D91412F-6252-4BB8-8116-75E2A335B244}"/>
+                <a16:creationId xmlns:a16="http://schemas.microsoft.com/office/drawing/2014/main" xmlns="" id="{9D91412F-6252-4BB8-8116-75E2A335B244}"/>
               </a:ext>
             </a:extLst>
           </p:cNvPr>
@@ -2968,7 +2969,7 @@
           <p:cNvPr id="6" name="슬라이드 번호 개체 틀 5">
             <a:extLst>
               <a:ext uri="{FF2B5EF4-FFF2-40B4-BE49-F238E27FC236}">
-                <a16:creationId xmlns="" xmlns:a16="http://schemas.microsoft.com/office/drawing/2014/main" id="{461127FD-EA7E-4325-A700-686E7B2A457C}"/>
+                <a16:creationId xmlns:a16="http://schemas.microsoft.com/office/drawing/2014/main" xmlns="" id="{461127FD-EA7E-4325-A700-686E7B2A457C}"/>
               </a:ext>
             </a:extLst>
           </p:cNvPr>
@@ -3336,7 +3337,7 @@
           <p:cNvPr id="4" name="직사각형 3">
             <a:extLst>
               <a:ext uri="{FF2B5EF4-FFF2-40B4-BE49-F238E27FC236}">
-                <a16:creationId xmlns="" xmlns:a16="http://schemas.microsoft.com/office/drawing/2014/main" id="{1B2F3058-F52D-4977-9513-34794EA5FC1E}"/>
+                <a16:creationId xmlns:a16="http://schemas.microsoft.com/office/drawing/2014/main" xmlns="" id="{1B2F3058-F52D-4977-9513-34794EA5FC1E}"/>
               </a:ext>
             </a:extLst>
           </p:cNvPr>
@@ -3382,7 +3383,7 @@
           <p:cNvPr id="5" name="TextBox 4">
             <a:extLst>
               <a:ext uri="{FF2B5EF4-FFF2-40B4-BE49-F238E27FC236}">
-                <a16:creationId xmlns="" xmlns:a16="http://schemas.microsoft.com/office/drawing/2014/main" id="{3045B1B7-A108-4882-96BB-0AF82DFD4815}"/>
+                <a16:creationId xmlns:a16="http://schemas.microsoft.com/office/drawing/2014/main" xmlns="" id="{3045B1B7-A108-4882-96BB-0AF82DFD4815}"/>
               </a:ext>
             </a:extLst>
           </p:cNvPr>
@@ -3606,7 +3607,7 @@
           <p:cNvPr id="4" name="직사각형 3">
             <a:extLst>
               <a:ext uri="{FF2B5EF4-FFF2-40B4-BE49-F238E27FC236}">
-                <a16:creationId xmlns="" xmlns:a16="http://schemas.microsoft.com/office/drawing/2014/main" id="{4CF3FFFC-71D6-45DB-90CE-A587BAAE55C2}"/>
+                <a16:creationId xmlns:a16="http://schemas.microsoft.com/office/drawing/2014/main" xmlns="" id="{4CF3FFFC-71D6-45DB-90CE-A587BAAE55C2}"/>
               </a:ext>
             </a:extLst>
           </p:cNvPr>
@@ -3678,7 +3679,7 @@
           <p:cNvPr id="5" name="TextBox 4">
             <a:extLst>
               <a:ext uri="{FF2B5EF4-FFF2-40B4-BE49-F238E27FC236}">
-                <a16:creationId xmlns="" xmlns:a16="http://schemas.microsoft.com/office/drawing/2014/main" id="{C3AC7DC5-8DC9-47B6-8A4E-5D71A06BA3FA}"/>
+                <a16:creationId xmlns:a16="http://schemas.microsoft.com/office/drawing/2014/main" xmlns="" id="{C3AC7DC5-8DC9-47B6-8A4E-5D71A06BA3FA}"/>
               </a:ext>
             </a:extLst>
           </p:cNvPr>
@@ -3722,7 +3723,7 @@
           <p:cNvPr id="7" name="TextBox 6">
             <a:extLst>
               <a:ext uri="{FF2B5EF4-FFF2-40B4-BE49-F238E27FC236}">
-                <a16:creationId xmlns="" xmlns:a16="http://schemas.microsoft.com/office/drawing/2014/main" id="{B6877478-785B-4866-882A-E7552BCAC33E}"/>
+                <a16:creationId xmlns:a16="http://schemas.microsoft.com/office/drawing/2014/main" xmlns="" id="{B6877478-785B-4866-882A-E7552BCAC33E}"/>
               </a:ext>
             </a:extLst>
           </p:cNvPr>
@@ -3929,7 +3930,7 @@
           <p:cNvPr id="4" name="TextBox 3">
             <a:extLst>
               <a:ext uri="{FF2B5EF4-FFF2-40B4-BE49-F238E27FC236}">
-                <a16:creationId xmlns="" xmlns:a16="http://schemas.microsoft.com/office/drawing/2014/main" id="{4DA032E8-57E8-4877-864A-6A66C6772E1B}"/>
+                <a16:creationId xmlns:a16="http://schemas.microsoft.com/office/drawing/2014/main" xmlns="" id="{4DA032E8-57E8-4877-864A-6A66C6772E1B}"/>
               </a:ext>
             </a:extLst>
           </p:cNvPr>
@@ -3972,7 +3973,7 @@
           <p:cNvPr id="5" name="TextBox 4">
             <a:extLst>
               <a:ext uri="{FF2B5EF4-FFF2-40B4-BE49-F238E27FC236}">
-                <a16:creationId xmlns="" xmlns:a16="http://schemas.microsoft.com/office/drawing/2014/main" id="{B08CCE5D-13CF-41E4-A19F-B4C908EFD8DD}"/>
+                <a16:creationId xmlns:a16="http://schemas.microsoft.com/office/drawing/2014/main" xmlns="" id="{B08CCE5D-13CF-41E4-A19F-B4C908EFD8DD}"/>
               </a:ext>
             </a:extLst>
           </p:cNvPr>
@@ -4170,7 +4171,7 @@
           <p:cNvPr id="7" name="TextBox 6">
             <a:extLst>
               <a:ext uri="{FF2B5EF4-FFF2-40B4-BE49-F238E27FC236}">
-                <a16:creationId xmlns="" xmlns:a16="http://schemas.microsoft.com/office/drawing/2014/main" id="{AD055F34-ADE9-4125-BCE7-AD98B46DE483}"/>
+                <a16:creationId xmlns:a16="http://schemas.microsoft.com/office/drawing/2014/main" xmlns="" id="{AD055F34-ADE9-4125-BCE7-AD98B46DE483}"/>
               </a:ext>
             </a:extLst>
           </p:cNvPr>
@@ -4244,7 +4245,7 @@
           <p:cNvPr id="5" name="표 4">
             <a:extLst>
               <a:ext uri="{FF2B5EF4-FFF2-40B4-BE49-F238E27FC236}">
-                <a16:creationId xmlns="" xmlns:a16="http://schemas.microsoft.com/office/drawing/2014/main" id="{7297FA94-65D5-4591-96DC-A09C8D375B56}"/>
+                <a16:creationId xmlns:a16="http://schemas.microsoft.com/office/drawing/2014/main" xmlns="" id="{7297FA94-65D5-4591-96DC-A09C8D375B56}"/>
               </a:ext>
             </a:extLst>
           </p:cNvPr>
@@ -4271,7 +4272,7 @@
                 <a:gridCol w="11480800">
                   <a:extLst>
                     <a:ext uri="{9D8B030D-6E8A-4147-A177-3AD203B41FA5}">
-                      <a16:colId xmlns="" xmlns:a16="http://schemas.microsoft.com/office/drawing/2014/main" val="3419752138"/>
+                      <a16:colId xmlns:a16="http://schemas.microsoft.com/office/drawing/2014/main" xmlns="" val="3419752138"/>
                     </a:ext>
                   </a:extLst>
                 </a:gridCol>
@@ -4602,7 +4603,7 @@
                 </a:tc>
                 <a:extLst>
                   <a:ext uri="{0D108BD9-81ED-4DB2-BD59-A6C34878D82A}">
-                    <a16:rowId xmlns="" xmlns:a16="http://schemas.microsoft.com/office/drawing/2014/main" val="2904178367"/>
+                    <a16:rowId xmlns:a16="http://schemas.microsoft.com/office/drawing/2014/main" xmlns="" val="2904178367"/>
                   </a:ext>
                 </a:extLst>
               </a:tr>
@@ -4615,7 +4616,7 @@
           <p:cNvPr id="6" name="Rectangle 1">
             <a:extLst>
               <a:ext uri="{FF2B5EF4-FFF2-40B4-BE49-F238E27FC236}">
-                <a16:creationId xmlns="" xmlns:a16="http://schemas.microsoft.com/office/drawing/2014/main" id="{04D3C521-BE58-429E-9FD1-EA93719A8D45}"/>
+                <a16:creationId xmlns:a16="http://schemas.microsoft.com/office/drawing/2014/main" xmlns="" id="{04D3C521-BE58-429E-9FD1-EA93719A8D45}"/>
               </a:ext>
             </a:extLst>
           </p:cNvPr>
@@ -4734,7 +4735,7 @@
           <p:cNvPr id="7" name="TextBox 6">
             <a:extLst>
               <a:ext uri="{FF2B5EF4-FFF2-40B4-BE49-F238E27FC236}">
-                <a16:creationId xmlns="" xmlns:a16="http://schemas.microsoft.com/office/drawing/2014/main" id="{AD90AF65-AC71-49D0-9A7F-568BA461EFD4}"/>
+                <a16:creationId xmlns:a16="http://schemas.microsoft.com/office/drawing/2014/main" xmlns="" id="{AD90AF65-AC71-49D0-9A7F-568BA461EFD4}"/>
               </a:ext>
             </a:extLst>
           </p:cNvPr>
@@ -4993,7 +4994,7 @@
           <p:cNvPr id="5" name="TextBox 4">
             <a:extLst>
               <a:ext uri="{FF2B5EF4-FFF2-40B4-BE49-F238E27FC236}">
-                <a16:creationId xmlns="" xmlns:a16="http://schemas.microsoft.com/office/drawing/2014/main" id="{AD90AF65-AC71-49D0-9A7F-568BA461EFD4}"/>
+                <a16:creationId xmlns:a16="http://schemas.microsoft.com/office/drawing/2014/main" xmlns="" id="{AD90AF65-AC71-49D0-9A7F-568BA461EFD4}"/>
               </a:ext>
             </a:extLst>
           </p:cNvPr>
@@ -5264,7 +5265,7 @@
           <p:cNvPr id="5" name="TextBox 4">
             <a:extLst>
               <a:ext uri="{FF2B5EF4-FFF2-40B4-BE49-F238E27FC236}">
-                <a16:creationId xmlns="" xmlns:a16="http://schemas.microsoft.com/office/drawing/2014/main" id="{AD90AF65-AC71-49D0-9A7F-568BA461EFD4}"/>
+                <a16:creationId xmlns:a16="http://schemas.microsoft.com/office/drawing/2014/main" xmlns="" id="{AD90AF65-AC71-49D0-9A7F-568BA461EFD4}"/>
               </a:ext>
             </a:extLst>
           </p:cNvPr>
@@ -5336,11 +5337,7 @@
             </a:r>
             <a:r>
               <a:rPr lang="en-US" altLang="ko-KR" dirty="0" smtClean="0"/>
-              <a:t>. </a:t>
-            </a:r>
-            <a:r>
-              <a:rPr lang="en-US" altLang="ko-KR" dirty="0" smtClean="0"/>
-              <a:t>(</a:t>
+              <a:t>. (</a:t>
             </a:r>
             <a:r>
               <a:rPr lang="ko-KR" altLang="en-US" dirty="0" smtClean="0"/>
@@ -5385,7 +5382,7 @@
               <a:t>중복되어있는 것을 해결한다</a:t>
             </a:r>
             <a:r>
-              <a:rPr lang="en-US" altLang="ko-KR" smtClean="0"/>
+              <a:rPr lang="en-US" altLang="ko-KR" dirty="0" smtClean="0"/>
               <a:t>.</a:t>
             </a:r>
             <a:endParaRPr lang="ko-KR" altLang="en-US" dirty="0"/>
@@ -5396,6 +5393,363 @@
     <p:extLst>
       <p:ext uri="{BB962C8B-B14F-4D97-AF65-F5344CB8AC3E}">
         <p14:creationId xmlns:p14="http://schemas.microsoft.com/office/powerpoint/2010/main" val="3000359082"/>
+      </p:ext>
+    </p:extLst>
+  </p:cSld>
+  <p:clrMapOvr>
+    <a:masterClrMapping/>
+  </p:clrMapOvr>
+</p:sld>
+</file>
+
+<file path=ppt/slides/slide7.xml><?xml version="1.0" encoding="utf-8"?>
+<p:sld xmlns:a="http://schemas.openxmlformats.org/drawingml/2006/main" xmlns:r="http://schemas.openxmlformats.org/officeDocument/2006/relationships" xmlns:p="http://schemas.openxmlformats.org/presentationml/2006/main">
+  <p:cSld>
+    <p:spTree>
+      <p:nvGrpSpPr>
+        <p:cNvPr id="1" name=""/>
+        <p:cNvGrpSpPr/>
+        <p:nvPr/>
+      </p:nvGrpSpPr>
+      <p:grpSpPr>
+        <a:xfrm>
+          <a:off x="0" y="0"/>
+          <a:ext cx="0" cy="0"/>
+          <a:chOff x="0" y="0"/>
+          <a:chExt cx="0" cy="0"/>
+        </a:xfrm>
+      </p:grpSpPr>
+      <p:sp>
+        <p:nvSpPr>
+          <p:cNvPr id="4" name="직사각형 3"/>
+          <p:cNvSpPr/>
+          <p:nvPr/>
+        </p:nvSpPr>
+        <p:spPr>
+          <a:xfrm>
+            <a:off x="1576062" y="2775521"/>
+            <a:ext cx="11335265" cy="707886"/>
+          </a:xfrm>
+          <a:prstGeom prst="rect">
+            <a:avLst/>
+          </a:prstGeom>
+        </p:spPr>
+        <p:txBody>
+          <a:bodyPr wrap="square">
+            <a:spAutoFit/>
+          </a:bodyPr>
+          <a:lstStyle/>
+          <a:p>
+            <a:r>
+              <a:rPr lang="ko-KR" altLang="en-US" sz="2000" b="1" dirty="0">
+                <a:solidFill>
+                  <a:srgbClr val="FF0000"/>
+                </a:solidFill>
+                <a:latin typeface="나눔스퀘어 ExtraBold" pitchFamily="50" charset="-127"/>
+                <a:ea typeface="나눔스퀘어 ExtraBold" pitchFamily="50" charset="-127"/>
+              </a:rPr>
+              <a:t>오류 보고 </a:t>
+            </a:r>
+            <a:r>
+              <a:rPr lang="en-US" altLang="ko-KR" sz="2000" b="1" dirty="0">
+                <a:solidFill>
+                  <a:srgbClr val="FF0000"/>
+                </a:solidFill>
+                <a:latin typeface="나눔스퀘어 ExtraBold" pitchFamily="50" charset="-127"/>
+                <a:ea typeface="나눔스퀘어 ExtraBold" pitchFamily="50" charset="-127"/>
+              </a:rPr>
+              <a:t>-</a:t>
+            </a:r>
+          </a:p>
+          <a:p>
+            <a:r>
+              <a:rPr lang="en-US" altLang="ko-KR" sz="2000" b="1" dirty="0">
+                <a:solidFill>
+                  <a:srgbClr val="FF0000"/>
+                </a:solidFill>
+                <a:latin typeface="나눔스퀘어 ExtraBold" pitchFamily="50" charset="-127"/>
+                <a:ea typeface="나눔스퀘어 ExtraBold" pitchFamily="50" charset="-127"/>
+              </a:rPr>
+              <a:t>ORA-02291: integrity constraint </a:t>
+            </a:r>
+            <a:r>
+              <a:rPr lang="en-US" altLang="ko-KR" sz="2000" b="1" dirty="0" smtClean="0">
+                <a:solidFill>
+                  <a:srgbClr val="FF0000"/>
+                </a:solidFill>
+                <a:latin typeface="나눔스퀘어 ExtraBold" pitchFamily="50" charset="-127"/>
+                <a:ea typeface="나눔스퀘어 ExtraBold" pitchFamily="50" charset="-127"/>
+              </a:rPr>
+              <a:t>(***) </a:t>
+            </a:r>
+            <a:r>
+              <a:rPr lang="en-US" altLang="ko-KR" sz="2000" b="1" dirty="0">
+                <a:solidFill>
+                  <a:srgbClr val="FF0000"/>
+                </a:solidFill>
+                <a:latin typeface="나눔스퀘어 ExtraBold" pitchFamily="50" charset="-127"/>
+                <a:ea typeface="나눔스퀘어 ExtraBold" pitchFamily="50" charset="-127"/>
+              </a:rPr>
+              <a:t>violated - parent key not found</a:t>
+            </a:r>
+            <a:endParaRPr lang="ko-KR" altLang="en-US" sz="2000" b="1" dirty="0">
+              <a:solidFill>
+                <a:srgbClr val="FF0000"/>
+              </a:solidFill>
+              <a:latin typeface="나눔스퀘어 ExtraBold" pitchFamily="50" charset="-127"/>
+              <a:ea typeface="나눔스퀘어 ExtraBold" pitchFamily="50" charset="-127"/>
+            </a:endParaRPr>
+          </a:p>
+        </p:txBody>
+      </p:sp>
+      <p:sp>
+        <p:nvSpPr>
+          <p:cNvPr id="5" name="TextBox 4">
+            <a:extLst>
+              <a:ext uri="{FF2B5EF4-FFF2-40B4-BE49-F238E27FC236}">
+                <a16:creationId xmlns:a16="http://schemas.microsoft.com/office/drawing/2014/main" xmlns="" id="{AD90AF65-AC71-49D0-9A7F-568BA461EFD4}"/>
+              </a:ext>
+            </a:extLst>
+          </p:cNvPr>
+          <p:cNvSpPr txBox="1"/>
+          <p:nvPr/>
+        </p:nvSpPr>
+        <p:spPr>
+          <a:xfrm>
+            <a:off x="2560732" y="4332234"/>
+            <a:ext cx="11165840" cy="1169551"/>
+          </a:xfrm>
+          <a:prstGeom prst="rect">
+            <a:avLst/>
+          </a:prstGeom>
+          <a:noFill/>
+        </p:spPr>
+        <p:txBody>
+          <a:bodyPr wrap="square" rtlCol="0">
+            <a:spAutoFit/>
+          </a:bodyPr>
+          <a:lstStyle/>
+          <a:p>
+            <a:r>
+              <a:rPr lang="ko-KR" altLang="en-US" sz="1400" dirty="0">
+                <a:latin typeface="나눔스퀘어 ExtraBold" pitchFamily="50" charset="-127"/>
+                <a:ea typeface="나눔스퀘어 ExtraBold" pitchFamily="50" charset="-127"/>
+              </a:rPr>
+              <a:t>증상</a:t>
+            </a:r>
+            <a:r>
+              <a:rPr lang="en-US" altLang="ko-KR" sz="1400" dirty="0">
+                <a:latin typeface="나눔스퀘어 ExtraBold" pitchFamily="50" charset="-127"/>
+                <a:ea typeface="나눔스퀘어 ExtraBold" pitchFamily="50" charset="-127"/>
+              </a:rPr>
+              <a:t>: </a:t>
+            </a:r>
+            <a:r>
+              <a:rPr lang="ko-KR" altLang="en-US" sz="1400" dirty="0" smtClean="0">
+                <a:latin typeface="나눔스퀘어 ExtraBold" pitchFamily="50" charset="-127"/>
+                <a:ea typeface="나눔스퀘어 ExtraBold" pitchFamily="50" charset="-127"/>
+              </a:rPr>
+              <a:t>테이블에 </a:t>
+            </a:r>
+            <a:r>
+              <a:rPr lang="en-US" altLang="ko-KR" sz="1400" dirty="0" smtClean="0">
+                <a:latin typeface="나눔스퀘어 ExtraBold" pitchFamily="50" charset="-127"/>
+                <a:ea typeface="나눔스퀘어 ExtraBold" pitchFamily="50" charset="-127"/>
+              </a:rPr>
+              <a:t>insert</a:t>
+            </a:r>
+            <a:r>
+              <a:rPr lang="ko-KR" altLang="en-US" sz="1400" dirty="0" smtClean="0">
+                <a:latin typeface="나눔스퀘어 ExtraBold" pitchFamily="50" charset="-127"/>
+                <a:ea typeface="나눔스퀘어 ExtraBold" pitchFamily="50" charset="-127"/>
+              </a:rPr>
+              <a:t>하려고 하는데 에러가 남</a:t>
+            </a:r>
+            <a:endParaRPr lang="en-US" altLang="ko-KR" sz="1400" dirty="0" smtClean="0">
+              <a:latin typeface="나눔스퀘어 ExtraBold" pitchFamily="50" charset="-127"/>
+              <a:ea typeface="나눔스퀘어 ExtraBold" pitchFamily="50" charset="-127"/>
+            </a:endParaRPr>
+          </a:p>
+          <a:p>
+            <a:r>
+              <a:rPr lang="ko-KR" altLang="en-US" sz="1400" dirty="0" smtClean="0">
+                <a:latin typeface="나눔스퀘어 ExtraBold" pitchFamily="50" charset="-127"/>
+                <a:ea typeface="나눔스퀘어 ExtraBold" pitchFamily="50" charset="-127"/>
+              </a:rPr>
+              <a:t>원인</a:t>
+            </a:r>
+            <a:r>
+              <a:rPr lang="en-US" altLang="ko-KR" sz="1400" dirty="0" smtClean="0">
+                <a:latin typeface="나눔스퀘어 ExtraBold" pitchFamily="50" charset="-127"/>
+                <a:ea typeface="나눔스퀘어 ExtraBold" pitchFamily="50" charset="-127"/>
+              </a:rPr>
+              <a:t>: </a:t>
+            </a:r>
+            <a:r>
+              <a:rPr lang="ko-KR" altLang="en-US" sz="1400" dirty="0" smtClean="0">
+                <a:latin typeface="나눔스퀘어 ExtraBold" pitchFamily="50" charset="-127"/>
+                <a:ea typeface="나눔스퀘어 ExtraBold" pitchFamily="50" charset="-127"/>
+              </a:rPr>
+              <a:t>자식테이블에서 부모테이블을 참조해서 </a:t>
+            </a:r>
+            <a:r>
+              <a:rPr lang="en-US" altLang="ko-KR" sz="1400" dirty="0" smtClean="0">
+                <a:latin typeface="나눔스퀘어 ExtraBold" pitchFamily="50" charset="-127"/>
+                <a:ea typeface="나눔스퀘어 ExtraBold" pitchFamily="50" charset="-127"/>
+              </a:rPr>
+              <a:t>insert </a:t>
+            </a:r>
+            <a:r>
+              <a:rPr lang="ko-KR" altLang="en-US" sz="1400" dirty="0" smtClean="0">
+                <a:latin typeface="나눔스퀘어 ExtraBold" pitchFamily="50" charset="-127"/>
+                <a:ea typeface="나눔스퀘어 ExtraBold" pitchFamily="50" charset="-127"/>
+              </a:rPr>
+              <a:t>하고 있는데 </a:t>
+            </a:r>
+            <a:r>
+              <a:rPr lang="ko-KR" altLang="en-US" sz="1400" dirty="0" err="1" smtClean="0">
+                <a:latin typeface="나눔스퀘어 ExtraBold" pitchFamily="50" charset="-127"/>
+                <a:ea typeface="나눔스퀘어 ExtraBold" pitchFamily="50" charset="-127"/>
+              </a:rPr>
+              <a:t>부모키가</a:t>
+            </a:r>
+            <a:r>
+              <a:rPr lang="ko-KR" altLang="en-US" sz="1400" dirty="0" smtClean="0">
+                <a:latin typeface="나눔스퀘어 ExtraBold" pitchFamily="50" charset="-127"/>
+                <a:ea typeface="나눔스퀘어 ExtraBold" pitchFamily="50" charset="-127"/>
+              </a:rPr>
+              <a:t> 없을 때 에러가 나타난다</a:t>
+            </a:r>
+            <a:r>
+              <a:rPr lang="en-US" altLang="ko-KR" sz="1400" dirty="0" smtClean="0">
+                <a:latin typeface="나눔스퀘어 ExtraBold" pitchFamily="50" charset="-127"/>
+                <a:ea typeface="나눔스퀘어 ExtraBold" pitchFamily="50" charset="-127"/>
+              </a:rPr>
+              <a:t>.</a:t>
+            </a:r>
+            <a:endParaRPr lang="en-US" altLang="ko-KR" sz="1400" dirty="0">
+              <a:latin typeface="나눔스퀘어 ExtraBold" pitchFamily="50" charset="-127"/>
+              <a:ea typeface="나눔스퀘어 ExtraBold" pitchFamily="50" charset="-127"/>
+            </a:endParaRPr>
+          </a:p>
+          <a:p>
+            <a:endParaRPr lang="en-US" altLang="ko-KR" sz="1400" dirty="0">
+              <a:latin typeface="나눔스퀘어 ExtraBold" pitchFamily="50" charset="-127"/>
+              <a:ea typeface="나눔스퀘어 ExtraBold" pitchFamily="50" charset="-127"/>
+            </a:endParaRPr>
+          </a:p>
+          <a:p>
+            <a:r>
+              <a:rPr lang="ko-KR" altLang="en-US" sz="1400" dirty="0">
+                <a:latin typeface="나눔스퀘어 ExtraBold" pitchFamily="50" charset="-127"/>
+                <a:ea typeface="나눔스퀘어 ExtraBold" pitchFamily="50" charset="-127"/>
+              </a:rPr>
+              <a:t>해결</a:t>
+            </a:r>
+            <a:r>
+              <a:rPr lang="en-US" altLang="ko-KR" sz="1400" dirty="0" smtClean="0">
+                <a:latin typeface="나눔스퀘어 ExtraBold" pitchFamily="50" charset="-127"/>
+                <a:ea typeface="나눔스퀘어 ExtraBold" pitchFamily="50" charset="-127"/>
+              </a:rPr>
+              <a:t>: </a:t>
+            </a:r>
+            <a:r>
+              <a:rPr lang="en-US" altLang="ko-KR" sz="1400" dirty="0" smtClean="0">
+                <a:latin typeface="나눔스퀘어 ExtraBold" pitchFamily="50" charset="-127"/>
+                <a:ea typeface="나눔스퀘어 ExtraBold" pitchFamily="50" charset="-127"/>
+              </a:rPr>
+              <a:t>1) </a:t>
+            </a:r>
+            <a:r>
+              <a:rPr lang="ko-KR" altLang="en-US" sz="1400" dirty="0" smtClean="0">
+                <a:latin typeface="나눔스퀘어 ExtraBold" pitchFamily="50" charset="-127"/>
+                <a:ea typeface="나눔스퀘어 ExtraBold" pitchFamily="50" charset="-127"/>
+              </a:rPr>
+              <a:t>부모테이블에 있는 키를 이용해 자식테이블에 </a:t>
+            </a:r>
+            <a:r>
+              <a:rPr lang="en-US" altLang="ko-KR" sz="1400" dirty="0" smtClean="0">
+                <a:latin typeface="나눔스퀘어 ExtraBold" pitchFamily="50" charset="-127"/>
+                <a:ea typeface="나눔스퀘어 ExtraBold" pitchFamily="50" charset="-127"/>
+              </a:rPr>
+              <a:t>insert</a:t>
+            </a:r>
+            <a:r>
+              <a:rPr lang="ko-KR" altLang="en-US" sz="1400" dirty="0" smtClean="0">
+                <a:latin typeface="나눔스퀘어 ExtraBold" pitchFamily="50" charset="-127"/>
+                <a:ea typeface="나눔스퀘어 ExtraBold" pitchFamily="50" charset="-127"/>
+              </a:rPr>
+              <a:t>한다</a:t>
+            </a:r>
+            <a:r>
+              <a:rPr lang="en-US" altLang="ko-KR" sz="1400" dirty="0" smtClean="0">
+                <a:latin typeface="나눔스퀘어 ExtraBold" pitchFamily="50" charset="-127"/>
+                <a:ea typeface="나눔스퀘어 ExtraBold" pitchFamily="50" charset="-127"/>
+              </a:rPr>
+              <a:t>.</a:t>
+            </a:r>
+          </a:p>
+          <a:p>
+            <a:r>
+              <a:rPr lang="en-US" altLang="ko-KR" sz="1400" dirty="0">
+                <a:latin typeface="나눔스퀘어 ExtraBold" pitchFamily="50" charset="-127"/>
+                <a:ea typeface="나눔스퀘어 ExtraBold" pitchFamily="50" charset="-127"/>
+              </a:rPr>
+              <a:t> </a:t>
+            </a:r>
+            <a:r>
+              <a:rPr lang="en-US" altLang="ko-KR" sz="1400" dirty="0" smtClean="0">
+                <a:latin typeface="나눔스퀘어 ExtraBold" pitchFamily="50" charset="-127"/>
+                <a:ea typeface="나눔스퀘어 ExtraBold" pitchFamily="50" charset="-127"/>
+              </a:rPr>
+              <a:t>      2) insert</a:t>
+            </a:r>
+            <a:r>
+              <a:rPr lang="ko-KR" altLang="en-US" sz="1400" dirty="0" smtClean="0">
+                <a:latin typeface="나눔스퀘어 ExtraBold" pitchFamily="50" charset="-127"/>
+                <a:ea typeface="나눔스퀘어 ExtraBold" pitchFamily="50" charset="-127"/>
+              </a:rPr>
+              <a:t>하려고 했던 정보를 미리 부모테이블에 </a:t>
+            </a:r>
+            <a:r>
+              <a:rPr lang="en-US" altLang="ko-KR" sz="1400" dirty="0" smtClean="0">
+                <a:latin typeface="나눔스퀘어 ExtraBold" pitchFamily="50" charset="-127"/>
+                <a:ea typeface="나눔스퀘어 ExtraBold" pitchFamily="50" charset="-127"/>
+              </a:rPr>
+              <a:t>insert</a:t>
+            </a:r>
+            <a:r>
+              <a:rPr lang="ko-KR" altLang="en-US" sz="1400" dirty="0" smtClean="0">
+                <a:latin typeface="나눔스퀘어 ExtraBold" pitchFamily="50" charset="-127"/>
+                <a:ea typeface="나눔스퀘어 ExtraBold" pitchFamily="50" charset="-127"/>
+              </a:rPr>
+              <a:t>하여 </a:t>
+            </a:r>
+            <a:r>
+              <a:rPr lang="ko-KR" altLang="en-US" sz="1400" dirty="0" err="1" smtClean="0">
+                <a:latin typeface="나눔스퀘어 ExtraBold" pitchFamily="50" charset="-127"/>
+                <a:ea typeface="나눔스퀘어 ExtraBold" pitchFamily="50" charset="-127"/>
+              </a:rPr>
+              <a:t>존재하게한다</a:t>
+            </a:r>
+            <a:r>
+              <a:rPr lang="en-US" altLang="ko-KR" sz="1400" dirty="0" smtClean="0">
+                <a:latin typeface="나눔스퀘어 ExtraBold" pitchFamily="50" charset="-127"/>
+                <a:ea typeface="나눔스퀘어 ExtraBold" pitchFamily="50" charset="-127"/>
+              </a:rPr>
+              <a:t>.</a:t>
+            </a:r>
+            <a:endParaRPr lang="ko-KR" altLang="en-US" sz="1400" dirty="0">
+              <a:latin typeface="나눔스퀘어 ExtraBold" pitchFamily="50" charset="-127"/>
+              <a:ea typeface="나눔스퀘어 ExtraBold" pitchFamily="50" charset="-127"/>
+            </a:endParaRPr>
+          </a:p>
+        </p:txBody>
+      </p:sp>
+    </p:spTree>
+    <p:extLst>
+      <p:ext uri="{BB962C8B-B14F-4D97-AF65-F5344CB8AC3E}">
+        <p14:creationId xmlns:p14="http://schemas.microsoft.com/office/powerpoint/2010/main" val="2403233128"/>
       </p:ext>
     </p:extLst>
   </p:cSld>
@@ -5694,7 +6048,7 @@
   <a:extraClrSchemeLst/>
   <a:extLst>
     <a:ext uri="{05A4C25C-085E-4340-85A3-A5531E510DB2}">
-      <thm15:themeFamily xmlns="" xmlns:thm15="http://schemas.microsoft.com/office/thememl/2012/main" name="Office Theme" id="{62F939B6-93AF-4DB8-9C6B-D6C7DFDC589F}" vid="{4A3C46E8-61CC-4603-A589-7422A47A8E4A}"/>
+      <thm15:themeFamily xmlns:thm15="http://schemas.microsoft.com/office/thememl/2012/main" xmlns="" name="Office Theme" id="{62F939B6-93AF-4DB8-9C6B-D6C7DFDC589F}" vid="{4A3C46E8-61CC-4603-A589-7422A47A8E4A}"/>
     </a:ext>
   </a:extLst>
 </a:theme>

</xml_diff>